<commit_message>
todos complete, upload sample code send and receive between node & mqttlens
</commit_message>
<xml_diff>
--- a/FW/Hau/MQTT & JSON/MQTT&Json.pptx
+++ b/FW/Hau/MQTT & JSON/MQTT&Json.pptx
@@ -218,7 +218,7 @@
           <a:p>
             <a:fld id="{BE921E71-55FB-4F70-BA64-7E87629B9540}" type="datetimeFigureOut">
               <a:rPr lang="en-US" smtClean="0"/>
-              <a:t>7/25/2020</a:t>
+              <a:t>7/31/2020</a:t>
             </a:fld>
             <a:endParaRPr lang="en-US"/>
           </a:p>
@@ -3276,7 +3276,7 @@
           <a:p>
             <a:fld id="{6D9FEF56-C5D4-4D87-B961-211842A8ECEA}" type="datetime1">
               <a:rPr lang="en-US" smtClean="0"/>
-              <a:t>7/25/2020</a:t>
+              <a:t>7/31/2020</a:t>
             </a:fld>
             <a:endParaRPr lang="en-US"/>
           </a:p>
@@ -4892,11 +4892,7 @@
             </a:pPr>
             <a:r>
               <a:rPr lang="en-US" sz="1400" smtClean="0"/>
-              <a:t>PubSubClient </a:t>
-            </a:r>
-            <a:r>
-              <a:rPr lang="en-US" sz="1400" smtClean="0"/>
-              <a:t>&lt;name_of_client_mqtt&gt;(network_client);</a:t>
+              <a:t>PubSubClient &lt;name_of_client_mqtt&gt;(network_client);</a:t>
             </a:r>
           </a:p>
           <a:p>
@@ -4948,11 +4944,7 @@
             </a:r>
             <a:r>
               <a:rPr lang="en-US" sz="1400" smtClean="0"/>
-              <a:t>- boolean publish(topic, payload, [length], [retained</a:t>
-            </a:r>
-            <a:r>
-              <a:rPr lang="en-US" sz="1400" smtClean="0"/>
-              <a:t>]);</a:t>
+              <a:t>- boolean publish(topic, payload, [length], [retained]);</a:t>
             </a:r>
           </a:p>
           <a:p>
@@ -4971,11 +4963,7 @@
             </a:r>
             <a:r>
               <a:rPr lang="en-US" sz="1400"/>
-              <a:t>boolean publish(topic, </a:t>
-            </a:r>
-            <a:r>
-              <a:rPr lang="en-US" sz="1400"/>
-              <a:t>payload</a:t>
+              <a:t>boolean publish(topic, payload</a:t>
             </a:r>
             <a:r>
               <a:rPr lang="en-US" sz="1400" smtClean="0"/>
@@ -4983,17 +4971,12 @@
             </a:r>
             <a:r>
               <a:rPr lang="en-US" sz="1400"/>
-              <a:t>[</a:t>
-            </a:r>
-            <a:r>
-              <a:rPr lang="en-US" sz="1400"/>
-              <a:t>retained</a:t>
+              <a:t>[retained</a:t>
             </a:r>
             <a:r>
               <a:rPr lang="en-US" sz="1400" smtClean="0"/>
               <a:t>]);</a:t>
             </a:r>
-            <a:endParaRPr lang="en-US" sz="1400" smtClean="0"/>
           </a:p>
           <a:p>
             <a:pPr>
@@ -5007,11 +4990,7 @@
             </a:r>
             <a:r>
               <a:rPr lang="en-US" sz="1400" smtClean="0"/>
-              <a:t>- boolean subscribe(topic, [qos</a:t>
-            </a:r>
-            <a:r>
-              <a:rPr lang="en-US" sz="1400" smtClean="0"/>
-              <a:t>]);</a:t>
+              <a:t>- boolean subscribe(topic, [qos]);</a:t>
             </a:r>
           </a:p>
           <a:p>
@@ -5022,9 +5001,8 @@
             </a:pPr>
             <a:r>
               <a:rPr lang="en-US" sz="1400" smtClean="0"/>
-              <a:t> - boolean publish(topic, payload, [qos], [retained]);</a:t>
-            </a:r>
-            <a:endParaRPr lang="en-US" sz="1400" smtClean="0"/>
+              <a:t> </a:t>
+            </a:r>
           </a:p>
         </p:txBody>
       </p:sp>

</xml_diff>